<commit_message>
aula anderson, trab + uc_8 briefing micro 2000
</commit_message>
<xml_diff>
--- a/UC_3/aula_1/ApresentacaoFULL.pptx
+++ b/UC_3/aula_1/ApresentacaoFULL.pptx
@@ -31,11 +31,11 @@
     <p:sldId id="277" r:id="rId25"/>
     <p:sldId id="278" r:id="rId26"/>
     <p:sldId id="279" r:id="rId27"/>
-    <p:sldId id="264" r:id="rId28"/>
-    <p:sldId id="265" r:id="rId29"/>
-    <p:sldId id="269" r:id="rId30"/>
-    <p:sldId id="280" r:id="rId31"/>
-    <p:sldId id="289" r:id="rId32"/>
+    <p:sldId id="265" r:id="rId28"/>
+    <p:sldId id="269" r:id="rId29"/>
+    <p:sldId id="280" r:id="rId30"/>
+    <p:sldId id="289" r:id="rId31"/>
+    <p:sldId id="264" r:id="rId32"/>
     <p:sldId id="263" r:id="rId33"/>
   </p:sldIdLst>
   <p:sldSz cx="12192000" cy="6858000"/>
@@ -283,7 +283,7 @@
           <a:p>
             <a:fld id="{04A3E5E7-3360-4D12-B9E7-49E20BF306B1}" type="datetimeFigureOut">
               <a:rPr lang="pt-BR" smtClean="0"/>
-              <a:t>29/04/2019</a:t>
+              <a:t>06/05/2019</a:t>
             </a:fld>
             <a:endParaRPr lang="pt-BR"/>
           </a:p>
@@ -451,7 +451,7 @@
           <a:p>
             <a:fld id="{04A3E5E7-3360-4D12-B9E7-49E20BF306B1}" type="datetimeFigureOut">
               <a:rPr lang="pt-BR" smtClean="0"/>
-              <a:t>29/04/2019</a:t>
+              <a:t>06/05/2019</a:t>
             </a:fld>
             <a:endParaRPr lang="pt-BR"/>
           </a:p>
@@ -629,7 +629,7 @@
           <a:p>
             <a:fld id="{04A3E5E7-3360-4D12-B9E7-49E20BF306B1}" type="datetimeFigureOut">
               <a:rPr lang="pt-BR" smtClean="0"/>
-              <a:t>29/04/2019</a:t>
+              <a:t>06/05/2019</a:t>
             </a:fld>
             <a:endParaRPr lang="pt-BR"/>
           </a:p>
@@ -797,7 +797,7 @@
           <a:p>
             <a:fld id="{04A3E5E7-3360-4D12-B9E7-49E20BF306B1}" type="datetimeFigureOut">
               <a:rPr lang="pt-BR" smtClean="0"/>
-              <a:t>29/04/2019</a:t>
+              <a:t>06/05/2019</a:t>
             </a:fld>
             <a:endParaRPr lang="pt-BR"/>
           </a:p>
@@ -1042,7 +1042,7 @@
           <a:p>
             <a:fld id="{04A3E5E7-3360-4D12-B9E7-49E20BF306B1}" type="datetimeFigureOut">
               <a:rPr lang="pt-BR" smtClean="0"/>
-              <a:t>29/04/2019</a:t>
+              <a:t>06/05/2019</a:t>
             </a:fld>
             <a:endParaRPr lang="pt-BR"/>
           </a:p>
@@ -1271,7 +1271,7 @@
           <a:p>
             <a:fld id="{04A3E5E7-3360-4D12-B9E7-49E20BF306B1}" type="datetimeFigureOut">
               <a:rPr lang="pt-BR" smtClean="0"/>
-              <a:t>29/04/2019</a:t>
+              <a:t>06/05/2019</a:t>
             </a:fld>
             <a:endParaRPr lang="pt-BR"/>
           </a:p>
@@ -1635,7 +1635,7 @@
           <a:p>
             <a:fld id="{04A3E5E7-3360-4D12-B9E7-49E20BF306B1}" type="datetimeFigureOut">
               <a:rPr lang="pt-BR" smtClean="0"/>
-              <a:t>29/04/2019</a:t>
+              <a:t>06/05/2019</a:t>
             </a:fld>
             <a:endParaRPr lang="pt-BR"/>
           </a:p>
@@ -1752,7 +1752,7 @@
           <a:p>
             <a:fld id="{04A3E5E7-3360-4D12-B9E7-49E20BF306B1}" type="datetimeFigureOut">
               <a:rPr lang="pt-BR" smtClean="0"/>
-              <a:t>29/04/2019</a:t>
+              <a:t>06/05/2019</a:t>
             </a:fld>
             <a:endParaRPr lang="pt-BR"/>
           </a:p>
@@ -1847,7 +1847,7 @@
           <a:p>
             <a:fld id="{04A3E5E7-3360-4D12-B9E7-49E20BF306B1}" type="datetimeFigureOut">
               <a:rPr lang="pt-BR" smtClean="0"/>
-              <a:t>29/04/2019</a:t>
+              <a:t>06/05/2019</a:t>
             </a:fld>
             <a:endParaRPr lang="pt-BR"/>
           </a:p>
@@ -2122,7 +2122,7 @@
           <a:p>
             <a:fld id="{04A3E5E7-3360-4D12-B9E7-49E20BF306B1}" type="datetimeFigureOut">
               <a:rPr lang="pt-BR" smtClean="0"/>
-              <a:t>29/04/2019</a:t>
+              <a:t>06/05/2019</a:t>
             </a:fld>
             <a:endParaRPr lang="pt-BR"/>
           </a:p>
@@ -2374,7 +2374,7 @@
           <a:p>
             <a:fld id="{04A3E5E7-3360-4D12-B9E7-49E20BF306B1}" type="datetimeFigureOut">
               <a:rPr lang="pt-BR" smtClean="0"/>
-              <a:t>29/04/2019</a:t>
+              <a:t>06/05/2019</a:t>
             </a:fld>
             <a:endParaRPr lang="pt-BR"/>
           </a:p>
@@ -2585,7 +2585,7 @@
           <a:p>
             <a:fld id="{04A3E5E7-3360-4D12-B9E7-49E20BF306B1}" type="datetimeFigureOut">
               <a:rPr lang="pt-BR" smtClean="0"/>
-              <a:t>29/04/2019</a:t>
+              <a:t>06/05/2019</a:t>
             </a:fld>
             <a:endParaRPr lang="pt-BR"/>
           </a:p>
@@ -3049,13 +3049,6 @@
   <p:clrMapOvr>
     <a:masterClrMapping/>
   </p:clrMapOvr>
-  <p:timing>
-    <p:tnLst>
-      <p:par>
-        <p:cTn id="1" dur="indefinite" restart="never" nodeType="tmRoot"/>
-      </p:par>
-    </p:tnLst>
-  </p:timing>
 </p:sld>
 </file>
 
@@ -3092,10 +3085,9 @@
           <a:lstStyle/>
           <a:p>
             <a:r>
-              <a:rPr lang="pt-BR" b="1" dirty="0" smtClean="0"/>
+              <a:rPr lang="pt-BR" b="1" dirty="0"/>
               <a:t>VERSÕES E MÉTODOS HTTP</a:t>
             </a:r>
-            <a:endParaRPr lang="pt-BR" b="1" dirty="0"/>
           </a:p>
         </p:txBody>
       </p:sp>
@@ -3116,19 +3108,18 @@
           <a:p>
             <a:pPr algn="just"/>
             <a:r>
-              <a:rPr lang="pt-BR" dirty="0" smtClean="0"/>
+              <a:rPr lang="pt-BR" dirty="0"/>
               <a:t>O HTTP tem cinco versões, que são: HTTP/0.9, HTTP/1.0, HTTP/1.1, SDPY e HTTP/2.0, sendo o HTTP/1.1 o mais utilizado atualmente.</a:t>
             </a:r>
+          </a:p>
+          <a:p>
+            <a:pPr algn="just"/>
             <a:endParaRPr lang="pt-BR" dirty="0"/>
           </a:p>
           <a:p>
             <a:pPr algn="just"/>
-            <a:endParaRPr lang="pt-BR" dirty="0" smtClean="0"/>
-          </a:p>
-          <a:p>
-            <a:pPr algn="just"/>
-            <a:r>
-              <a:rPr lang="pt-BR" dirty="0" smtClean="0"/>
+            <a:r>
+              <a:rPr lang="pt-BR" dirty="0"/>
               <a:t>Seus métodos de requisição são: GET, HEAD, POST, PUT, DELETE, CONNECT, OPTIONS, TRACE e PATCH, sendo o método GET o mais comum.</a:t>
             </a:r>
           </a:p>
@@ -3144,13 +3135,6 @@
   <p:clrMapOvr>
     <a:masterClrMapping/>
   </p:clrMapOvr>
-  <p:timing>
-    <p:tnLst>
-      <p:par>
-        <p:cTn id="1" dur="indefinite" restart="never" nodeType="tmRoot"/>
-      </p:par>
-    </p:tnLst>
-  </p:timing>
 </p:sld>
 </file>
 
@@ -3230,19 +3214,7 @@
               <a:rPr lang="pt-BR" dirty="0">
                 <a:cs typeface="Calibri"/>
               </a:rPr>
-              <a:t>É </a:t>
-            </a:r>
-            <a:r>
-              <a:rPr lang="pt-BR" dirty="0" smtClean="0">
-                <a:cs typeface="Calibri"/>
-              </a:rPr>
-              <a:t>um protocolo utilizado</a:t>
-            </a:r>
-            <a:r>
-              <a:rPr lang="pt-BR" dirty="0">
-                <a:cs typeface="Calibri"/>
-              </a:rPr>
-              <a:t> para transferência de páginas HTML do computador para a Internet;</a:t>
+              <a:t>É um protocolo utilizado para transferência de páginas HTML do computador para a Internet;</a:t>
             </a:r>
             <a:endParaRPr lang="pt-BR" dirty="0"/>
           </a:p>
@@ -3300,13 +3272,6 @@
   <p:clrMapOvr>
     <a:masterClrMapping/>
   </p:clrMapOvr>
-  <p:timing>
-    <p:tnLst>
-      <p:par>
-        <p:cTn id="1" dur="indefinite" restart="never" nodeType="tmRoot"/>
-      </p:par>
-    </p:tnLst>
-  </p:timing>
 </p:sld>
 </file>
 
@@ -3436,13 +3401,6 @@
   <p:clrMapOvr>
     <a:masterClrMapping/>
   </p:clrMapOvr>
-  <p:timing>
-    <p:tnLst>
-      <p:par>
-        <p:cTn id="1" dur="indefinite" restart="never" nodeType="tmRoot"/>
-      </p:par>
-    </p:tnLst>
-  </p:timing>
 </p:sld>
 </file>
 
@@ -3503,13 +3461,6 @@
   <p:clrMapOvr>
     <a:masterClrMapping/>
   </p:clrMapOvr>
-  <p:timing>
-    <p:tnLst>
-      <p:par>
-        <p:cTn id="1" dur="indefinite" restart="never" nodeType="tmRoot"/>
-      </p:par>
-    </p:tnLst>
-  </p:timing>
 </p:sld>
 </file>
 
@@ -3613,13 +3564,6 @@
   <p:clrMapOvr>
     <a:masterClrMapping/>
   </p:clrMapOvr>
-  <p:timing>
-    <p:tnLst>
-      <p:par>
-        <p:cTn id="1" dur="indefinite" restart="never" nodeType="tmRoot"/>
-      </p:par>
-    </p:tnLst>
-  </p:timing>
 </p:sld>
 </file>
 
@@ -3819,13 +3763,6 @@
   <p:clrMapOvr>
     <a:masterClrMapping/>
   </p:clrMapOvr>
-  <p:timing>
-    <p:tnLst>
-      <p:par>
-        <p:cTn id="1" dur="indefinite" restart="never" nodeType="tmRoot"/>
-      </p:par>
-    </p:tnLst>
-  </p:timing>
 </p:sld>
 </file>
 
@@ -3996,13 +3933,6 @@
   <p:clrMapOvr>
     <a:masterClrMapping/>
   </p:clrMapOvr>
-  <p:timing>
-    <p:tnLst>
-      <p:par>
-        <p:cTn id="1" dur="indefinite" restart="never" nodeType="tmRoot"/>
-      </p:par>
-    </p:tnLst>
-  </p:timing>
 </p:sld>
 </file>
 
@@ -4062,13 +3992,8 @@
           <a:p>
             <a:r>
               <a:rPr lang="pt-BR" dirty="0"/>
-              <a:t>HTTPS é uma extensão segura do </a:t>
-            </a:r>
-            <a:r>
-              <a:rPr lang="pt-BR" dirty="0" smtClean="0"/>
-              <a:t>HTTP;</a:t>
-            </a:r>
-            <a:endParaRPr lang="pt-BR" dirty="0"/>
+              <a:t>HTTPS é uma extensão segura do HTTP;</a:t>
+            </a:r>
           </a:p>
           <a:p>
             <a:r>
@@ -4101,13 +4026,8 @@
             </a:r>
             <a:r>
               <a:rPr lang="pt-BR" dirty="0"/>
-              <a:t> (HTTPS</a:t>
-            </a:r>
-            <a:r>
-              <a:rPr lang="pt-BR" dirty="0" smtClean="0"/>
-              <a:t>);</a:t>
-            </a:r>
-            <a:endParaRPr lang="pt-BR" dirty="0"/>
+              <a:t> (HTTPS);</a:t>
+            </a:r>
           </a:p>
           <a:p>
             <a:r>
@@ -4127,13 +4047,6 @@
   <p:clrMapOvr>
     <a:masterClrMapping/>
   </p:clrMapOvr>
-  <p:timing>
-    <p:tnLst>
-      <p:par>
-        <p:cTn id="1" dur="indefinite" restart="never" nodeType="tmRoot"/>
-      </p:par>
-    </p:tnLst>
-  </p:timing>
 </p:sld>
 </file>
 
@@ -4241,11 +4154,7 @@
           <a:p>
             <a:r>
               <a:rPr lang="pt-BR" dirty="0"/>
-              <a:t>Chaves para sessões</a:t>
-            </a:r>
-            <a:r>
-              <a:rPr lang="pt-BR" dirty="0" smtClean="0"/>
-              <a:t>;</a:t>
+              <a:t>Chaves para sessões;</a:t>
             </a:r>
           </a:p>
         </p:txBody>
@@ -4260,13 +4169,6 @@
   <p:clrMapOvr>
     <a:masterClrMapping/>
   </p:clrMapOvr>
-  <p:timing>
-    <p:tnLst>
-      <p:par>
-        <p:cTn id="1" dur="indefinite" restart="never" nodeType="tmRoot"/>
-      </p:par>
-    </p:tnLst>
-  </p:timing>
 </p:sld>
 </file>
 
@@ -4326,35 +4228,20 @@
           <a:p>
             <a:r>
               <a:rPr lang="pt-BR" dirty="0"/>
-              <a:t>Diferenças pequenas e </a:t>
-            </a:r>
-            <a:r>
-              <a:rPr lang="pt-BR" dirty="0" smtClean="0"/>
-              <a:t>técnicas;</a:t>
-            </a:r>
-            <a:endParaRPr lang="pt-BR" dirty="0"/>
+              <a:t>Diferenças pequenas e técnicas;</a:t>
+            </a:r>
           </a:p>
           <a:p>
             <a:r>
               <a:rPr lang="pt-BR" dirty="0"/>
-              <a:t>TLS utiliza portas </a:t>
-            </a:r>
-            <a:r>
-              <a:rPr lang="pt-BR" dirty="0" smtClean="0"/>
-              <a:t>diferentes;</a:t>
-            </a:r>
-            <a:endParaRPr lang="pt-BR" dirty="0"/>
+              <a:t>TLS utiliza portas diferentes;</a:t>
+            </a:r>
           </a:p>
           <a:p>
             <a:r>
               <a:rPr lang="pt-BR" dirty="0"/>
-              <a:t>TLS algoritmos de criptografia mais </a:t>
-            </a:r>
-            <a:r>
-              <a:rPr lang="pt-BR" dirty="0" smtClean="0"/>
-              <a:t>fortes.</a:t>
-            </a:r>
-            <a:endParaRPr lang="pt-BR" dirty="0"/>
+              <a:t>TLS algoritmos de criptografia mais fortes.</a:t>
+            </a:r>
           </a:p>
         </p:txBody>
       </p:sp>
@@ -4368,13 +4255,6 @@
   <p:clrMapOvr>
     <a:masterClrMapping/>
   </p:clrMapOvr>
-  <p:timing>
-    <p:tnLst>
-      <p:par>
-        <p:cTn id="1" dur="indefinite" restart="never" nodeType="tmRoot"/>
-      </p:par>
-    </p:tnLst>
-  </p:timing>
 </p:sld>
 </file>
 
@@ -4411,7 +4291,7 @@
                 <a16:creationId xmlns:a16="http://schemas.microsoft.com/office/drawing/2014/main" id="{C0B27210-D0CA-4654-B3E3-9ABB4F178EA1}"/>
               </a:ext>
               <a:ext uri="{C183D7F6-B498-43B3-948B-1728B52AA6E4}">
-                <adec:decorative xmlns="" xmlns:adec="http://schemas.microsoft.com/office/drawing/2017/decorative" val="1"/>
+                <adec:decorative xmlns:adec="http://schemas.microsoft.com/office/drawing/2017/decorative" val="1"/>
               </a:ext>
             </a:extLst>
           </p:cNvPr>
@@ -4627,7 +4507,7 @@
                 <a16:creationId xmlns:a16="http://schemas.microsoft.com/office/drawing/2014/main" id="{1DB7C82F-AB7E-4F0C-B829-FA1B9C415180}"/>
               </a:ext>
               <a:ext uri="{C183D7F6-B498-43B3-948B-1728B52AA6E4}">
-                <adec:decorative xmlns="" xmlns:adec="http://schemas.microsoft.com/office/drawing/2017/decorative" val="1"/>
+                <adec:decorative xmlns:adec="http://schemas.microsoft.com/office/drawing/2017/decorative" val="1"/>
               </a:ext>
             </a:extLst>
           </p:cNvPr>
@@ -4794,7 +4674,7 @@
                 <a16:creationId xmlns:a16="http://schemas.microsoft.com/office/drawing/2014/main" id="{70B66945-4967-4040-926D-DCA44313CDAB}"/>
               </a:ext>
               <a:ext uri="{C183D7F6-B498-43B3-948B-1728B52AA6E4}">
-                <adec:decorative xmlns="" xmlns:adec="http://schemas.microsoft.com/office/drawing/2017/decorative" val="1"/>
+                <adec:decorative xmlns:adec="http://schemas.microsoft.com/office/drawing/2017/decorative" val="1"/>
               </a:ext>
             </a:extLst>
           </p:cNvPr>
@@ -4997,13 +4877,6 @@
   <p:clrMapOvr>
     <a:masterClrMapping/>
   </p:clrMapOvr>
-  <p:timing>
-    <p:tnLst>
-      <p:par>
-        <p:cTn id="1" dur="indefinite" restart="never" nodeType="tmRoot"/>
-      </p:par>
-    </p:tnLst>
-  </p:timing>
 </p:sld>
 </file>
 
@@ -5238,35 +5111,20 @@
           <a:p>
             <a:r>
               <a:rPr lang="pt-BR" dirty="0"/>
-              <a:t>É uma ferramenta de análise de tráfego de </a:t>
-            </a:r>
-            <a:r>
-              <a:rPr lang="pt-BR" dirty="0" smtClean="0"/>
-              <a:t>rede;</a:t>
-            </a:r>
-            <a:endParaRPr lang="pt-BR" dirty="0"/>
+              <a:t>É uma ferramenta de análise de tráfego de rede;</a:t>
+            </a:r>
           </a:p>
           <a:p>
             <a:r>
               <a:rPr lang="pt-BR" dirty="0"/>
-              <a:t>Muito utilizada para monitorar entrada e saída de </a:t>
-            </a:r>
-            <a:r>
-              <a:rPr lang="pt-BR" dirty="0" smtClean="0"/>
-              <a:t>dados;</a:t>
-            </a:r>
-            <a:endParaRPr lang="pt-BR" dirty="0"/>
+              <a:t>Muito utilizada para monitorar entrada e saída de dados;</a:t>
+            </a:r>
           </a:p>
           <a:p>
             <a:r>
               <a:rPr lang="pt-BR" dirty="0"/>
-              <a:t>Trabalha com diferentes </a:t>
-            </a:r>
-            <a:r>
-              <a:rPr lang="pt-BR" dirty="0" smtClean="0"/>
-              <a:t>protocolos.</a:t>
-            </a:r>
-            <a:endParaRPr lang="pt-BR" dirty="0"/>
+              <a:t>Trabalha com diferentes protocolos.</a:t>
+            </a:r>
           </a:p>
           <a:p>
             <a:r>
@@ -5548,16 +5406,6 @@
                 <a:ea typeface="Calibri" panose="020F0502020204030204" pitchFamily="34" charset="0"/>
               </a:rPr>
             </a:br>
-            <a:r>
-              <a:rPr lang="pt-BR" sz="2000" dirty="0">
-                <a:solidFill>
-                  <a:srgbClr val="222222"/>
-                </a:solidFill>
-                <a:latin typeface="Arial" panose="020B0604020202020204" pitchFamily="34" charset="0"/>
-                <a:ea typeface="Calibri" panose="020F0502020204030204" pitchFamily="34" charset="0"/>
-              </a:rPr>
-              <a:t/>
-            </a:r>
             <a:br>
               <a:rPr lang="pt-BR" sz="2000" dirty="0">
                 <a:solidFill>
@@ -6201,7 +6049,7 @@
           <a:p>
             <a:r>
               <a:rPr lang="pt-BR" b="1" dirty="0"/>
-              <a:t>Hora da Brincadeira Pessoal !!!</a:t>
+              <a:t>Referências</a:t>
             </a:r>
           </a:p>
         </p:txBody>
@@ -6218,13 +6066,109 @@
         </p:nvSpPr>
         <p:spPr/>
         <p:txBody>
-          <a:bodyPr/>
-          <a:lstStyle/>
-          <a:p>
-            <a:r>
-              <a:rPr lang="pt-BR" dirty="0" smtClean="0"/>
-              <a:t>Vamos ver se realmente entendemos !</a:t>
-            </a:r>
+          <a:bodyPr>
+            <a:normAutofit fontScale="85000" lnSpcReduction="20000"/>
+          </a:bodyPr>
+          <a:lstStyle/>
+          <a:p>
+            <a:r>
+              <a:rPr lang="pt-BR" dirty="0">
+                <a:hlinkClick r:id="rId2"/>
+              </a:rPr>
+              <a:t>https://www.hostinger.com.br/tutoriais/o-que-e-ssl-tls-https/</a:t>
+            </a:r>
+            <a:endParaRPr lang="pt-BR" dirty="0"/>
+          </a:p>
+          <a:p>
+            <a:r>
+              <a:rPr lang="pt-BR" dirty="0"/>
+              <a:t>TANENBAUM, A. S. </a:t>
+            </a:r>
+            <a:r>
+              <a:rPr lang="pt-BR" b="1" dirty="0"/>
+              <a:t>Redes de computadores</a:t>
+            </a:r>
+            <a:r>
+              <a:rPr lang="pt-BR" dirty="0"/>
+              <a:t>. 4ed. 2003. Rio de Janeiro: </a:t>
+            </a:r>
+            <a:r>
+              <a:rPr lang="pt-BR" dirty="0" err="1"/>
+              <a:t>Elsevier</a:t>
+            </a:r>
+            <a:r>
+              <a:rPr lang="pt-BR" dirty="0"/>
+              <a:t> Editora. 2003.</a:t>
+            </a:r>
+          </a:p>
+          <a:p>
+            <a:r>
+              <a:rPr lang="pt-BR" dirty="0"/>
+              <a:t>SITE BLINDADO. </a:t>
+            </a:r>
+            <a:r>
+              <a:rPr lang="pt-BR" b="1" dirty="0"/>
+              <a:t>TLS x SSL</a:t>
+            </a:r>
+            <a:r>
+              <a:rPr lang="pt-BR" dirty="0"/>
+              <a:t>: quais diferenças desses protocolos?. Disponível em: &lt; http://blog.siteblindado.com/2014/02/07/tls-ssl-diferencas-protocolos/ &gt;. Acessado em: 14 Set. 2017.</a:t>
+            </a:r>
+          </a:p>
+          <a:p>
+            <a:r>
+              <a:rPr lang="pt-BR" dirty="0"/>
+              <a:t>COMODO BR. </a:t>
+            </a:r>
+            <a:r>
+              <a:rPr lang="pt-BR" b="1" dirty="0"/>
+              <a:t>O que é SSL?. </a:t>
+            </a:r>
+            <a:r>
+              <a:rPr lang="pt-BR" dirty="0"/>
+              <a:t>Disponível em: &lt;http://www.comodobr.com/ssl_o_que_e.php&gt;. Acessado em: 14 Set. 2017.</a:t>
+            </a:r>
+          </a:p>
+          <a:p>
+            <a:r>
+              <a:rPr lang="pt-BR" dirty="0"/>
+              <a:t>WIKIPÉDIA. </a:t>
+            </a:r>
+            <a:r>
+              <a:rPr lang="pt-BR" dirty="0" err="1"/>
+              <a:t>Transport</a:t>
+            </a:r>
+            <a:r>
+              <a:rPr lang="pt-BR" dirty="0"/>
+              <a:t> </a:t>
+            </a:r>
+            <a:r>
+              <a:rPr lang="pt-BR" dirty="0" err="1"/>
+              <a:t>Layer</a:t>
+            </a:r>
+            <a:r>
+              <a:rPr lang="pt-BR" dirty="0"/>
+              <a:t> Security. Disponível em: &lt; https://pt.wikipedia.org/wiki/Transport_Layer_Security&gt;. Acessado em: 14 Set. 2017.</a:t>
+            </a:r>
+          </a:p>
+          <a:p>
+            <a:r>
+              <a:rPr lang="pt-BR" dirty="0"/>
+              <a:t>GTA / UFRJ. </a:t>
+            </a:r>
+            <a:r>
+              <a:rPr lang="pt-BR" b="1" dirty="0"/>
+              <a:t>SSL x TLS</a:t>
+            </a:r>
+            <a:r>
+              <a:rPr lang="pt-BR" dirty="0"/>
+              <a:t>. Disponível em: &lt; https://www.gta.ufrj.br/grad/06_1/ssl/func_tls.htm&gt;. Acessado em: 14 Set. 2017.</a:t>
+            </a:r>
+          </a:p>
+          <a:p>
+            <a:endParaRPr lang="pt-BR" dirty="0"/>
+          </a:p>
+          <a:p>
             <a:endParaRPr lang="pt-BR" dirty="0"/>
           </a:p>
         </p:txBody>
@@ -6232,7 +6176,7 @@
     </p:spTree>
     <p:extLst>
       <p:ext uri="{BB962C8B-B14F-4D97-AF65-F5344CB8AC3E}">
-        <p14:creationId xmlns:p14="http://schemas.microsoft.com/office/powerpoint/2010/main" val="1663024192"/>
+        <p14:creationId xmlns:p14="http://schemas.microsoft.com/office/powerpoint/2010/main" val="402661431"/>
       </p:ext>
     </p:extLst>
   </p:cSld>
@@ -6274,11 +6218,7 @@
           <a:bodyPr/>
           <a:lstStyle/>
           <a:p>
-            <a:r>
-              <a:rPr lang="pt-BR" b="1" dirty="0" smtClean="0"/>
-              <a:t>Referências</a:t>
-            </a:r>
-            <a:endParaRPr lang="pt-BR" b="1" dirty="0"/>
+            <a:endParaRPr lang="pt-BR"/>
           </a:p>
         </p:txBody>
       </p:sp>
@@ -6292,109 +6232,93 @@
             <p:ph idx="1"/>
           </p:nvPr>
         </p:nvSpPr>
-        <p:spPr/>
+        <p:spPr>
+          <a:xfrm>
+            <a:off x="838200" y="1825624"/>
+            <a:ext cx="10515600" cy="5032375"/>
+          </a:xfrm>
+        </p:spPr>
         <p:txBody>
           <a:bodyPr>
-            <a:normAutofit fontScale="85000" lnSpcReduction="20000"/>
+            <a:normAutofit/>
           </a:bodyPr>
           <a:lstStyle/>
           <a:p>
             <a:r>
-              <a:rPr lang="pt-BR" dirty="0">
+              <a:rPr lang="pt-BR" sz="2400" dirty="0">
                 <a:hlinkClick r:id="rId2"/>
               </a:rPr>
-              <a:t>https://www.hostinger.com.br/tutoriais/o-que-e-ssl-tls-https/</a:t>
-            </a:r>
-            <a:endParaRPr lang="pt-BR" dirty="0"/>
-          </a:p>
-          <a:p>
-            <a:r>
-              <a:rPr lang="pt-BR" dirty="0"/>
-              <a:t>TANENBAUM, A. S. </a:t>
-            </a:r>
-            <a:r>
-              <a:rPr lang="pt-BR" b="1" dirty="0"/>
-              <a:t>Redes de computadores</a:t>
-            </a:r>
-            <a:r>
-              <a:rPr lang="pt-BR" dirty="0"/>
-              <a:t>. 4ed. 2003. Rio de Janeiro: </a:t>
-            </a:r>
-            <a:r>
-              <a:rPr lang="pt-BR" dirty="0" err="1"/>
-              <a:t>Elsevier</a:t>
-            </a:r>
-            <a:r>
-              <a:rPr lang="pt-BR" dirty="0"/>
-              <a:t> Editora. 2003.</a:t>
-            </a:r>
-          </a:p>
-          <a:p>
-            <a:r>
-              <a:rPr lang="pt-BR" dirty="0"/>
-              <a:t>SITE BLINDADO. </a:t>
-            </a:r>
-            <a:r>
-              <a:rPr lang="pt-BR" b="1" dirty="0"/>
-              <a:t>TLS x SSL</a:t>
-            </a:r>
-            <a:r>
-              <a:rPr lang="pt-BR" dirty="0"/>
-              <a:t>: quais diferenças desses protocolos?. Disponível em: &lt; http://blog.siteblindado.com/2014/02/07/tls-ssl-diferencas-protocolos/ &gt;. Acessado em: 14 Set. 2017.</a:t>
-            </a:r>
-          </a:p>
-          <a:p>
-            <a:r>
-              <a:rPr lang="pt-BR" dirty="0"/>
-              <a:t>COMODO BR. </a:t>
-            </a:r>
-            <a:r>
-              <a:rPr lang="pt-BR" b="1" dirty="0"/>
-              <a:t>O que é SSL?. </a:t>
-            </a:r>
-            <a:r>
-              <a:rPr lang="pt-BR" dirty="0"/>
-              <a:t>Disponível em: &lt;http://www.comodobr.com/ssl_o_que_e.php&gt;. Acessado em: 14 Set. 2017.</a:t>
-            </a:r>
-          </a:p>
-          <a:p>
-            <a:r>
-              <a:rPr lang="pt-BR" dirty="0"/>
-              <a:t>WIKIPÉDIA. </a:t>
-            </a:r>
-            <a:r>
-              <a:rPr lang="pt-BR" dirty="0" err="1"/>
-              <a:t>Transport</a:t>
-            </a:r>
-            <a:r>
-              <a:rPr lang="pt-BR" dirty="0"/>
-              <a:t> </a:t>
-            </a:r>
-            <a:r>
-              <a:rPr lang="pt-BR" dirty="0" err="1"/>
-              <a:t>Layer</a:t>
-            </a:r>
-            <a:r>
-              <a:rPr lang="pt-BR" dirty="0"/>
-              <a:t> Security. Disponível em: &lt; https://pt.wikipedia.org/wiki/Transport_Layer_Security&gt;. Acessado em: 14 Set. 2017.</a:t>
-            </a:r>
-          </a:p>
-          <a:p>
-            <a:r>
-              <a:rPr lang="pt-BR" dirty="0"/>
-              <a:t>GTA / UFRJ. </a:t>
-            </a:r>
-            <a:r>
-              <a:rPr lang="pt-BR" b="1" dirty="0"/>
-              <a:t>SSL x TLS</a:t>
-            </a:r>
-            <a:r>
-              <a:rPr lang="pt-BR" dirty="0"/>
-              <a:t>. Disponível em: &lt; https://www.gta.ufrj.br/grad/06_1/ssl/func_tls.htm&gt;. Acessado em: 14 Set. 2017.</a:t>
-            </a:r>
-          </a:p>
-          <a:p>
-            <a:endParaRPr lang="pt-BR" dirty="0"/>
+              <a:t>https://blog.siteblindado.com/tls-ssl-diferencas-protocolos/</a:t>
+            </a:r>
+            <a:endParaRPr lang="pt-BR" sz="2400" dirty="0"/>
+          </a:p>
+          <a:p>
+            <a:r>
+              <a:rPr lang="pt-BR" sz="2400" dirty="0">
+                <a:hlinkClick r:id="rId3"/>
+              </a:rPr>
+              <a:t>https://ex2.com.br/blog/web-1-0-web-2-0-e-web-3-0-enfim-o-que-e-isso/</a:t>
+            </a:r>
+          </a:p>
+          <a:p>
+            <a:r>
+              <a:rPr lang="pt-BR" sz="2400" dirty="0">
+                <a:hlinkClick r:id="rId4"/>
+              </a:rPr>
+              <a:t>https://www.significados.com.br/world-</a:t>
+            </a:r>
+            <a:r>
+              <a:rPr lang="pt-BR" sz="2400" dirty="0" err="1">
+                <a:hlinkClick r:id="rId4"/>
+              </a:rPr>
+              <a:t>wide</a:t>
+            </a:r>
+            <a:r>
+              <a:rPr lang="pt-BR" sz="2400" dirty="0">
+                <a:hlinkClick r:id="rId4"/>
+              </a:rPr>
+              <a:t>-web/.</a:t>
+            </a:r>
+          </a:p>
+          <a:p>
+            <a:r>
+              <a:rPr lang="pt-BR" sz="2400" dirty="0">
+                <a:hlinkClick r:id="rId5"/>
+              </a:rPr>
+              <a:t>https://pt.wikipedia.org/wiki/World_Wide_Web</a:t>
+            </a:r>
+          </a:p>
+          <a:p>
+            <a:r>
+              <a:rPr lang="pt-BR" sz="2400" dirty="0">
+                <a:hlinkClick r:id="rId6"/>
+              </a:rPr>
+              <a:t>https://www.youtube.com/watch?v=0edRAInT8iw</a:t>
+            </a:r>
+          </a:p>
+          <a:p>
+            <a:r>
+              <a:rPr lang="pt-BR" sz="2400" dirty="0">
+                <a:hlinkClick r:id="rId7"/>
+              </a:rPr>
+              <a:t>https://pt.wikipedia.org/wiki/Tim_Berners-Lee</a:t>
+            </a:r>
+          </a:p>
+          <a:p>
+            <a:r>
+              <a:rPr lang="pt-BR" sz="2400" dirty="0">
+                <a:hlinkClick r:id="rId8"/>
+              </a:rPr>
+              <a:t>https://pt.wikipedia.org/wiki/Hiperm%C3%ADdia</a:t>
+            </a:r>
+          </a:p>
+          <a:p>
+            <a:r>
+              <a:rPr lang="pt-BR" sz="2400" dirty="0">
+                <a:hlinkClick r:id="rId9"/>
+              </a:rPr>
+              <a:t>http://tecnologia.culturamix.com/internet/a-diferenca-entre-web-2-0-e-web-1-0</a:t>
+            </a:r>
           </a:p>
           <a:p>
             <a:endParaRPr lang="pt-BR" dirty="0"/>
@@ -6404,7 +6328,7 @@
     </p:spTree>
     <p:extLst>
       <p:ext uri="{BB962C8B-B14F-4D97-AF65-F5344CB8AC3E}">
-        <p14:creationId xmlns:p14="http://schemas.microsoft.com/office/powerpoint/2010/main" val="402661431"/>
+        <p14:creationId xmlns:p14="http://schemas.microsoft.com/office/powerpoint/2010/main" val="1097765755"/>
       </p:ext>
     </p:extLst>
   </p:cSld>
@@ -6460,95 +6384,109 @@
             <p:ph idx="1"/>
           </p:nvPr>
         </p:nvSpPr>
-        <p:spPr>
-          <a:xfrm>
-            <a:off x="838200" y="1825624"/>
-            <a:ext cx="10515600" cy="5032375"/>
-          </a:xfrm>
-        </p:spPr>
+        <p:spPr/>
         <p:txBody>
           <a:bodyPr>
-            <a:normAutofit/>
+            <a:normAutofit fontScale="77500" lnSpcReduction="20000"/>
           </a:bodyPr>
           <a:lstStyle/>
           <a:p>
             <a:r>
-              <a:rPr lang="pt-BR" sz="2400" dirty="0">
+              <a:rPr lang="pt-BR" u="sng" dirty="0">
                 <a:hlinkClick r:id="rId2"/>
               </a:rPr>
+              <a:t>https://sitechecker.pro/what-is-url/</a:t>
+            </a:r>
+            <a:endParaRPr lang="pt-BR" dirty="0"/>
+          </a:p>
+          <a:p>
+            <a:r>
+              <a:rPr lang="pt-BR" u="sng" dirty="0">
+                <a:hlinkClick r:id="rId3"/>
+              </a:rPr>
+              <a:t>https://gabnunes.com.br/melhores-praticas-para-urls-amigaveis/</a:t>
+            </a:r>
+            <a:endParaRPr lang="pt-BR" dirty="0"/>
+          </a:p>
+          <a:p>
+            <a:r>
+              <a:rPr lang="pt-BR" u="sng" dirty="0">
+                <a:hlinkClick r:id="rId4"/>
+              </a:rPr>
+              <a:t>https://www.quora.com/What-is-the-difference-between-URI-URL-and-URN</a:t>
+            </a:r>
+            <a:endParaRPr lang="pt-BR" dirty="0"/>
+          </a:p>
+          <a:p>
+            <a:r>
+              <a:rPr lang="pt-BR" u="sng" dirty="0">
+                <a:hlinkClick r:id="rId5"/>
+              </a:rPr>
+              <a:t>https://rockcontent.com/blog/url/</a:t>
+            </a:r>
+            <a:endParaRPr lang="pt-BR" dirty="0"/>
+          </a:p>
+          <a:p>
+            <a:r>
+              <a:rPr lang="pt-BR" u="sng" dirty="0">
+                <a:hlinkClick r:id="rId6"/>
+              </a:rPr>
+              <a:t>https://pt.wikipedia.org/wiki/URL</a:t>
+            </a:r>
+            <a:endParaRPr lang="pt-BR" dirty="0"/>
+          </a:p>
+          <a:p>
+            <a:r>
+              <a:rPr lang="pt-BR" u="sng" dirty="0">
+                <a:hlinkClick r:id="rId7"/>
+              </a:rPr>
+              <a:t>https://pt.stackoverflow.com/questions/43224/qual-a-diferen%C3%A7a-entre-url-e-uri</a:t>
+            </a:r>
+            <a:endParaRPr lang="pt-BR" dirty="0"/>
+          </a:p>
+          <a:p>
+            <a:r>
+              <a:rPr lang="pt-BR" u="sng" dirty="0">
+                <a:hlinkClick r:id="rId8"/>
+              </a:rPr>
+              <a:t>https://www.igluonline.com/qual-diferenca-entre-url-uri-e-urn/</a:t>
+            </a:r>
+            <a:endParaRPr lang="pt-BR" dirty="0"/>
+          </a:p>
+          <a:p>
+            <a:r>
+              <a:rPr lang="pt-BR" u="sng" dirty="0">
+                <a:hlinkClick r:id="rId9"/>
+              </a:rPr>
+              <a:t>https://www.youtube.com/watch?v=vpYct2npKD8</a:t>
+            </a:r>
+            <a:endParaRPr lang="pt-BR" dirty="0"/>
+          </a:p>
+          <a:p>
+            <a:r>
+              <a:rPr lang="pt-BR" u="sng" dirty="0">
+                <a:hlinkClick r:id="rId10"/>
+              </a:rPr>
+              <a:t>https://www.quora.com/Is-there-any-relation-between-URI-and-URL</a:t>
+            </a:r>
+            <a:endParaRPr lang="pt-BR" u="sng" dirty="0"/>
+          </a:p>
+          <a:p>
+            <a:r>
+              <a:rPr lang="pt-BR" dirty="0">
+                <a:hlinkClick r:id="rId11"/>
+              </a:rPr>
               <a:t>https://blog.siteblindado.com/tls-ssl-diferencas-protocolos/</a:t>
             </a:r>
-            <a:endParaRPr lang="pt-BR" sz="2400" dirty="0"/>
-          </a:p>
-          <a:p>
-            <a:r>
-              <a:rPr lang="pt-BR" sz="2400" dirty="0">
-                <a:hlinkClick r:id="rId3"/>
-              </a:rPr>
-              <a:t>https://ex2.com.br/blog/web-1-0-web-2-0-e-web-3-0-enfim-o-que-e-isso/</a:t>
-            </a:r>
-          </a:p>
-          <a:p>
-            <a:r>
-              <a:rPr lang="pt-BR" sz="2400" dirty="0">
-                <a:hlinkClick r:id="rId4"/>
-              </a:rPr>
-              <a:t>https://www.significados.com.br/world-</a:t>
-            </a:r>
-            <a:r>
-              <a:rPr lang="pt-BR" sz="2400" dirty="0" err="1">
-                <a:hlinkClick r:id="rId4"/>
-              </a:rPr>
-              <a:t>wide</a:t>
-            </a:r>
-            <a:r>
-              <a:rPr lang="pt-BR" sz="2400" dirty="0">
-                <a:hlinkClick r:id="rId4"/>
-              </a:rPr>
-              <a:t>-web/.</a:t>
-            </a:r>
-          </a:p>
-          <a:p>
-            <a:r>
-              <a:rPr lang="pt-BR" sz="2400" dirty="0">
-                <a:hlinkClick r:id="rId5"/>
-              </a:rPr>
-              <a:t>https://pt.wikipedia.org/wiki/World_Wide_Web</a:t>
-            </a:r>
-          </a:p>
-          <a:p>
-            <a:r>
-              <a:rPr lang="pt-BR" sz="2400" dirty="0">
-                <a:hlinkClick r:id="rId6"/>
-              </a:rPr>
-              <a:t>https://www.youtube.com/watch?v=0edRAInT8iw</a:t>
-            </a:r>
-          </a:p>
-          <a:p>
-            <a:r>
-              <a:rPr lang="pt-BR" sz="2400" dirty="0">
-                <a:hlinkClick r:id="rId7"/>
-              </a:rPr>
-              <a:t>https://pt.wikipedia.org/wiki/Tim_Berners-Lee</a:t>
-            </a:r>
-          </a:p>
-          <a:p>
-            <a:r>
-              <a:rPr lang="pt-BR" sz="2400" dirty="0">
-                <a:hlinkClick r:id="rId8"/>
-              </a:rPr>
-              <a:t>https://pt.wikipedia.org/wiki/Hiperm%C3%ADdia</a:t>
-            </a:r>
-          </a:p>
-          <a:p>
-            <a:r>
-              <a:rPr lang="pt-BR" sz="2400" dirty="0">
-                <a:hlinkClick r:id="rId9"/>
-              </a:rPr>
-              <a:t>http://tecnologia.culturamix.com/internet/a-diferenca-entre-web-2-0-e-web-1-0</a:t>
-            </a:r>
-          </a:p>
-          <a:p>
+            <a:endParaRPr lang="pt-BR" dirty="0"/>
+          </a:p>
+          <a:p>
+            <a:r>
+              <a:rPr lang="pt-BR" dirty="0">
+                <a:hlinkClick r:id="rId11"/>
+              </a:rPr>
+              <a:t>https://blog.siteblindado.com/tls-ssl-diferencas-protocolos/</a:t>
+            </a:r>
             <a:endParaRPr lang="pt-BR" dirty="0"/>
           </a:p>
         </p:txBody>
@@ -6556,7 +6494,7 @@
     </p:spTree>
     <p:extLst>
       <p:ext uri="{BB962C8B-B14F-4D97-AF65-F5344CB8AC3E}">
-        <p14:creationId xmlns:p14="http://schemas.microsoft.com/office/powerpoint/2010/main" val="1097765755"/>
+        <p14:creationId xmlns:p14="http://schemas.microsoft.com/office/powerpoint/2010/main" val="3864839545"/>
       </p:ext>
     </p:extLst>
   </p:cSld>
@@ -6599,7 +6537,7 @@
                 <a16:creationId xmlns:a16="http://schemas.microsoft.com/office/drawing/2014/main" id="{81AEB8A9-B768-4E30-BA55-D919E6687343}"/>
               </a:ext>
               <a:ext uri="{C183D7F6-B498-43B3-948B-1728B52AA6E4}">
-                <adec:decorative xmlns="" xmlns:adec="http://schemas.microsoft.com/office/drawing/2017/decorative" val="1"/>
+                <adec:decorative xmlns:adec="http://schemas.microsoft.com/office/drawing/2017/decorative" val="1"/>
               </a:ext>
             </a:extLst>
           </p:cNvPr>
@@ -6839,13 +6777,6 @@
   <p:clrMapOvr>
     <a:masterClrMapping/>
   </p:clrMapOvr>
-  <p:timing>
-    <p:tnLst>
-      <p:par>
-        <p:cTn id="1" dur="indefinite" restart="never" nodeType="tmRoot"/>
-      </p:par>
-    </p:tnLst>
-  </p:timing>
 </p:sld>
 </file>
 
@@ -6897,107 +6828,60 @@
         </p:nvSpPr>
         <p:spPr/>
         <p:txBody>
-          <a:bodyPr>
-            <a:normAutofit fontScale="77500" lnSpcReduction="20000"/>
-          </a:bodyPr>
-          <a:lstStyle/>
-          <a:p>
-            <a:r>
-              <a:rPr lang="pt-BR" u="sng" dirty="0">
+          <a:bodyPr/>
+          <a:lstStyle/>
+          <a:p>
+            <a:r>
+              <a:rPr lang="pt-BR" dirty="0">
+                <a:cs typeface="Calibri"/>
                 <a:hlinkClick r:id="rId2"/>
               </a:rPr>
-              <a:t>https://sitechecker.pro/what-is-url/</a:t>
-            </a:r>
-            <a:endParaRPr lang="pt-BR" dirty="0"/>
-          </a:p>
-          <a:p>
-            <a:r>
-              <a:rPr lang="pt-BR" u="sng" dirty="0">
+              <a:t>https://www.significados.com.br/http/</a:t>
+            </a:r>
+            <a:endParaRPr lang="pt-BR" dirty="0">
+              <a:cs typeface="Calibri"/>
+            </a:endParaRPr>
+          </a:p>
+          <a:p>
+            <a:r>
+              <a:rPr lang="pt-BR" dirty="0">
+                <a:cs typeface="Calibri"/>
                 <a:hlinkClick r:id="rId3"/>
               </a:rPr>
-              <a:t>https://gabnunes.com.br/melhores-praticas-para-urls-amigaveis/</a:t>
-            </a:r>
-            <a:endParaRPr lang="pt-BR" dirty="0"/>
-          </a:p>
-          <a:p>
-            <a:r>
-              <a:rPr lang="pt-BR" u="sng" dirty="0">
+              <a:t>https://pt.slideshare.net/tueslasantos/protocolos-de-comunicao-41370040</a:t>
+            </a:r>
+          </a:p>
+          <a:p>
+            <a:r>
+              <a:rPr lang="pt-BR" dirty="0">
+                <a:cs typeface="Calibri"/>
                 <a:hlinkClick r:id="rId4"/>
               </a:rPr>
-              <a:t>https://www.quora.com/What-is-the-difference-between-URI-URL-and-URN</a:t>
-            </a:r>
-            <a:endParaRPr lang="pt-BR" dirty="0"/>
-          </a:p>
-          <a:p>
-            <a:r>
-              <a:rPr lang="pt-BR" u="sng" dirty="0">
+              <a:t>https://pt.wikipedia.org/wiki/Hypertext_Transfer_Protocol</a:t>
+            </a:r>
+          </a:p>
+          <a:p>
+            <a:r>
+              <a:rPr lang="pt-BR" dirty="0">
+                <a:cs typeface="Calibri"/>
                 <a:hlinkClick r:id="rId5"/>
               </a:rPr>
-              <a:t>https://rockcontent.com/blog/url/</a:t>
-            </a:r>
-            <a:endParaRPr lang="pt-BR" dirty="0"/>
-          </a:p>
-          <a:p>
-            <a:r>
-              <a:rPr lang="pt-BR" u="sng" dirty="0">
+              <a:t>https://slideplayer.com.br/slide/1234082/</a:t>
+            </a:r>
+          </a:p>
+          <a:p>
+            <a:r>
+              <a:rPr lang="pt-BR" dirty="0">
+                <a:cs typeface="Calibri"/>
                 <a:hlinkClick r:id="rId6"/>
               </a:rPr>
-              <a:t>https://pt.wikipedia.org/wiki/URL</a:t>
-            </a:r>
-            <a:endParaRPr lang="pt-BR" dirty="0"/>
-          </a:p>
-          <a:p>
-            <a:r>
-              <a:rPr lang="pt-BR" u="sng" dirty="0">
-                <a:hlinkClick r:id="rId7"/>
-              </a:rPr>
-              <a:t>https://pt.stackoverflow.com/questions/43224/qual-a-diferen%C3%A7a-entre-url-e-uri</a:t>
-            </a:r>
-            <a:endParaRPr lang="pt-BR" dirty="0"/>
-          </a:p>
-          <a:p>
-            <a:r>
-              <a:rPr lang="pt-BR" u="sng" dirty="0">
-                <a:hlinkClick r:id="rId8"/>
-              </a:rPr>
-              <a:t>https://www.igluonline.com/qual-diferenca-entre-url-uri-e-urn/</a:t>
-            </a:r>
-            <a:endParaRPr lang="pt-BR" dirty="0"/>
-          </a:p>
-          <a:p>
-            <a:r>
-              <a:rPr lang="pt-BR" u="sng" dirty="0">
-                <a:hlinkClick r:id="rId9"/>
-              </a:rPr>
-              <a:t>https://www.youtube.com/watch?v=vpYct2npKD8</a:t>
-            </a:r>
-            <a:endParaRPr lang="pt-BR" dirty="0"/>
-          </a:p>
-          <a:p>
-            <a:r>
-              <a:rPr lang="pt-BR" u="sng" dirty="0">
-                <a:hlinkClick r:id="rId10"/>
-              </a:rPr>
-              <a:t>https://www.quora.com/Is-there-any-relation-between-URI-and-URL</a:t>
-            </a:r>
-            <a:endParaRPr lang="pt-BR" u="sng" dirty="0"/>
-          </a:p>
-          <a:p>
-            <a:r>
-              <a:rPr lang="pt-BR" dirty="0">
-                <a:hlinkClick r:id="rId11"/>
-              </a:rPr>
-              <a:t>https://blog.siteblindado.com/tls-ssl-diferencas-protocolos/</a:t>
-            </a:r>
-            <a:endParaRPr lang="pt-BR" dirty="0"/>
-          </a:p>
-          <a:p>
-            <a:r>
-              <a:rPr lang="pt-BR" dirty="0">
-                <a:hlinkClick r:id="rId11"/>
-              </a:rPr>
-              <a:t>https://blog.siteblindado.com/tls-ssl-diferencas-protocolos/</a:t>
-            </a:r>
+              <a:t>https://imasters.com.br/desenvolvimento/conhecendo-web-por-debaixo-dos-panos</a:t>
+            </a:r>
+            <a:endParaRPr lang="pt-BR" dirty="0">
+              <a:cs typeface="Calibri"/>
+            </a:endParaRPr>
+          </a:p>
+          <a:p>
             <a:endParaRPr lang="pt-BR" dirty="0"/>
           </a:p>
         </p:txBody>
@@ -7005,7 +6889,7 @@
     </p:spTree>
     <p:extLst>
       <p:ext uri="{BB962C8B-B14F-4D97-AF65-F5344CB8AC3E}">
-        <p14:creationId xmlns:p14="http://schemas.microsoft.com/office/powerpoint/2010/main" val="3864839545"/>
+        <p14:creationId xmlns:p14="http://schemas.microsoft.com/office/powerpoint/2010/main" val="1280374142"/>
       </p:ext>
     </p:extLst>
   </p:cSld>
@@ -7034,97 +6918,89 @@
       </p:grpSpPr>
       <p:sp>
         <p:nvSpPr>
-          <p:cNvPr id="2" name="Título 1"/>
-          <p:cNvSpPr>
-            <a:spLocks noGrp="1"/>
-          </p:cNvSpPr>
-          <p:nvPr>
-            <p:ph type="title"/>
-          </p:nvPr>
-        </p:nvSpPr>
-        <p:spPr/>
+          <p:cNvPr id="3" name="Espaço Reservado para Conteúdo 2"/>
+          <p:cNvSpPr>
+            <a:spLocks noGrp="1"/>
+          </p:cNvSpPr>
+          <p:nvPr>
+            <p:ph idx="1"/>
+          </p:nvPr>
+        </p:nvSpPr>
+        <p:spPr>
+          <a:xfrm>
+            <a:off x="176169" y="125834"/>
+            <a:ext cx="11845255" cy="6593747"/>
+          </a:xfrm>
+        </p:spPr>
         <p:txBody>
           <a:bodyPr/>
           <a:lstStyle/>
           <a:p>
-            <a:endParaRPr lang="pt-BR"/>
-          </a:p>
-        </p:txBody>
-      </p:sp>
-      <p:sp>
-        <p:nvSpPr>
-          <p:cNvPr id="3" name="Espaço Reservado para Conteúdo 2"/>
-          <p:cNvSpPr>
-            <a:spLocks noGrp="1"/>
-          </p:cNvSpPr>
-          <p:nvPr>
-            <p:ph idx="1"/>
-          </p:nvPr>
-        </p:nvSpPr>
-        <p:spPr/>
-        <p:txBody>
-          <a:bodyPr/>
-          <a:lstStyle/>
-          <a:p>
-            <a:r>
-              <a:rPr lang="pt-BR" dirty="0">
-                <a:cs typeface="Calibri"/>
-                <a:hlinkClick r:id="rId2"/>
-              </a:rPr>
-              <a:t>https://www.significados.com.br/http/</a:t>
-            </a:r>
-            <a:endParaRPr lang="pt-BR" dirty="0">
-              <a:cs typeface="Calibri"/>
-            </a:endParaRPr>
-          </a:p>
-          <a:p>
-            <a:r>
-              <a:rPr lang="pt-BR" dirty="0">
-                <a:cs typeface="Calibri"/>
-                <a:hlinkClick r:id="rId3"/>
-              </a:rPr>
-              <a:t>https://pt.slideshare.net/tueslasantos/protocolos-de-comunicao-41370040</a:t>
-            </a:r>
-          </a:p>
-          <a:p>
-            <a:r>
-              <a:rPr lang="pt-BR" dirty="0">
-                <a:cs typeface="Calibri"/>
-                <a:hlinkClick r:id="rId4"/>
-              </a:rPr>
-              <a:t>https://pt.wikipedia.org/wiki/Hypertext_Transfer_Protocol</a:t>
-            </a:r>
-          </a:p>
-          <a:p>
-            <a:r>
-              <a:rPr lang="pt-BR" dirty="0">
-                <a:cs typeface="Calibri"/>
-                <a:hlinkClick r:id="rId5"/>
-              </a:rPr>
-              <a:t>https://slideplayer.com.br/slide/1234082/</a:t>
-            </a:r>
-          </a:p>
-          <a:p>
-            <a:r>
-              <a:rPr lang="pt-BR" dirty="0">
-                <a:cs typeface="Calibri"/>
-                <a:hlinkClick r:id="rId6"/>
-              </a:rPr>
-              <a:t>https://imasters.com.br/desenvolvimento/conhecendo-web-por-debaixo-dos-panos</a:t>
-            </a:r>
-            <a:endParaRPr lang="pt-BR" dirty="0">
-              <a:cs typeface="Calibri"/>
-            </a:endParaRPr>
-          </a:p>
-          <a:p>
+            <a:pPr marL="0" indent="0" algn="ctr">
+              <a:buNone/>
+            </a:pPr>
+            <a:r>
+              <a:rPr lang="pt-BR" b="1" dirty="0"/>
+              <a:t>Hora da Brincadeira Pessoal !!!</a:t>
+            </a:r>
+          </a:p>
+          <a:p>
+            <a:pPr marL="0" indent="0" algn="ctr">
+              <a:buNone/>
+            </a:pPr>
+            <a:r>
+              <a:rPr lang="pt-BR" dirty="0"/>
+              <a:t>Vamos ver se realmente entendemos !</a:t>
+            </a:r>
+          </a:p>
+          <a:p>
+            <a:pPr marL="0" indent="0">
+              <a:buNone/>
+            </a:pPr>
             <a:endParaRPr lang="pt-BR" dirty="0"/>
           </a:p>
         </p:txBody>
       </p:sp>
+      <p:pic>
+        <p:nvPicPr>
+          <p:cNvPr id="5" name="Imagem 4">
+            <a:extLst>
+              <a:ext uri="{FF2B5EF4-FFF2-40B4-BE49-F238E27FC236}">
+                <a16:creationId xmlns:a16="http://schemas.microsoft.com/office/drawing/2014/main" id="{A81AC352-D5DD-4AAA-8BF8-A18711F5A956}"/>
+              </a:ext>
+            </a:extLst>
+          </p:cNvPr>
+          <p:cNvPicPr>
+            <a:picLocks noChangeAspect="1"/>
+          </p:cNvPicPr>
+          <p:nvPr/>
+        </p:nvPicPr>
+        <p:blipFill>
+          <a:blip r:embed="rId2">
+            <a:extLst>
+              <a:ext uri="{28A0092B-C50C-407E-A947-70E740481C1C}">
+                <a14:useLocalDpi xmlns:a14="http://schemas.microsoft.com/office/drawing/2010/main" val="0"/>
+              </a:ext>
+            </a:extLst>
+          </a:blip>
+          <a:stretch>
+            <a:fillRect/>
+          </a:stretch>
+        </p:blipFill>
+        <p:spPr>
+          <a:xfrm>
+            <a:off x="1362027" y="1462282"/>
+            <a:ext cx="9467946" cy="4969798"/>
+          </a:xfrm>
+          <a:prstGeom prst="rect">
+            <a:avLst/>
+          </a:prstGeom>
+        </p:spPr>
+      </p:pic>
     </p:spTree>
     <p:extLst>
       <p:ext uri="{BB962C8B-B14F-4D97-AF65-F5344CB8AC3E}">
-        <p14:creationId xmlns:p14="http://schemas.microsoft.com/office/powerpoint/2010/main" val="1280374142"/>
+        <p14:creationId xmlns:p14="http://schemas.microsoft.com/office/powerpoint/2010/main" val="1663024192"/>
       </p:ext>
     </p:extLst>
   </p:cSld>
@@ -7265,7 +7141,7 @@
                 <a16:creationId xmlns:a16="http://schemas.microsoft.com/office/drawing/2014/main" id="{81AEB8A9-B768-4E30-BA55-D919E6687343}"/>
               </a:ext>
               <a:ext uri="{C183D7F6-B498-43B3-948B-1728B52AA6E4}">
-                <adec:decorative xmlns="" xmlns:adec="http://schemas.microsoft.com/office/drawing/2017/decorative" val="1"/>
+                <adec:decorative xmlns:adec="http://schemas.microsoft.com/office/drawing/2017/decorative" val="1"/>
               </a:ext>
             </a:extLst>
           </p:cNvPr>
@@ -7530,13 +7406,6 @@
   <p:clrMapOvr>
     <a:masterClrMapping/>
   </p:clrMapOvr>
-  <p:timing>
-    <p:tnLst>
-      <p:par>
-        <p:cTn id="1" dur="indefinite" restart="never" nodeType="tmRoot"/>
-      </p:par>
-    </p:tnLst>
-  </p:timing>
 </p:sld>
 </file>
 
@@ -7573,7 +7442,7 @@
                 <a16:creationId xmlns:a16="http://schemas.microsoft.com/office/drawing/2014/main" id="{81AEB8A9-B768-4E30-BA55-D919E6687343}"/>
               </a:ext>
               <a:ext uri="{C183D7F6-B498-43B3-948B-1728B52AA6E4}">
-                <adec:decorative xmlns="" xmlns:adec="http://schemas.microsoft.com/office/drawing/2017/decorative" val="1"/>
+                <adec:decorative xmlns:adec="http://schemas.microsoft.com/office/drawing/2017/decorative" val="1"/>
               </a:ext>
             </a:extLst>
           </p:cNvPr>
@@ -7826,13 +7695,6 @@
   <p:clrMapOvr>
     <a:masterClrMapping/>
   </p:clrMapOvr>
-  <p:timing>
-    <p:tnLst>
-      <p:par>
-        <p:cTn id="1" dur="indefinite" restart="never" nodeType="tmRoot"/>
-      </p:par>
-    </p:tnLst>
-  </p:timing>
 </p:sld>
 </file>
 
@@ -7931,13 +7793,6 @@
   <p:clrMapOvr>
     <a:masterClrMapping/>
   </p:clrMapOvr>
-  <p:timing>
-    <p:tnLst>
-      <p:par>
-        <p:cTn id="1" dur="indefinite" restart="never" nodeType="tmRoot"/>
-      </p:par>
-    </p:tnLst>
-  </p:timing>
 </p:sld>
 </file>
 
@@ -8049,13 +7904,6 @@
   <p:clrMapOvr>
     <a:masterClrMapping/>
   </p:clrMapOvr>
-  <p:timing>
-    <p:tnLst>
-      <p:par>
-        <p:cTn id="1" dur="indefinite" restart="never" nodeType="tmRoot"/>
-      </p:par>
-    </p:tnLst>
-  </p:timing>
 </p:sld>
 </file>
 
@@ -8145,13 +7993,6 @@
   <p:clrMapOvr>
     <a:masterClrMapping/>
   </p:clrMapOvr>
-  <p:timing>
-    <p:tnLst>
-      <p:par>
-        <p:cTn id="1" dur="indefinite" restart="never" nodeType="tmRoot"/>
-      </p:par>
-    </p:tnLst>
-  </p:timing>
 </p:sld>
 </file>
 
@@ -8375,13 +8216,6 @@
   <p:clrMapOvr>
     <a:masterClrMapping/>
   </p:clrMapOvr>
-  <p:timing>
-    <p:tnLst>
-      <p:par>
-        <p:cTn id="1" dur="indefinite" restart="never" nodeType="tmRoot"/>
-      </p:par>
-    </p:tnLst>
-  </p:timing>
 </p:sld>
 </file>
 

</xml_diff>